<commit_message>
ultima subida actualizacion dce archivos 2do trimestre
</commit_message>
<xml_diff>
--- a/proyecto_formativo/documentacion/1er_trimestre/1 - Presentación_Sustentacion.pptx
+++ b/proyecto_formativo/documentacion/1er_trimestre/1 - Presentación_Sustentacion.pptx
@@ -310,7 +310,7 @@
           <a:p>
             <a:fld id="{B3030C24-9424-B24A-8613-79990C3AA492}" type="datetimeFigureOut">
               <a:rPr lang="es-ES" smtClean="0"/>
-              <a:t>31/03/2021</a:t>
+              <a:t>09/04/2021</a:t>
             </a:fld>
             <a:endParaRPr lang="es-ES"/>
           </a:p>
@@ -490,7 +490,7 @@
           <a:p>
             <a:fld id="{B3030C24-9424-B24A-8613-79990C3AA492}" type="datetimeFigureOut">
               <a:rPr lang="es-ES" smtClean="0"/>
-              <a:t>31/03/2021</a:t>
+              <a:t>09/04/2021</a:t>
             </a:fld>
             <a:endParaRPr lang="es-ES"/>
           </a:p>
@@ -1127,7 +1127,7 @@
           <a:p>
             <a:fld id="{B3030C24-9424-B24A-8613-79990C3AA492}" type="datetimeFigureOut">
               <a:rPr lang="es-ES" smtClean="0"/>
-              <a:t>31/03/2021</a:t>
+              <a:t>09/04/2021</a:t>
             </a:fld>
             <a:endParaRPr lang="es-ES"/>
           </a:p>
@@ -1380,7 +1380,7 @@
           <a:p>
             <a:fld id="{B3030C24-9424-B24A-8613-79990C3AA492}" type="datetimeFigureOut">
               <a:rPr lang="es-ES" smtClean="0"/>
-              <a:t>31/03/2021</a:t>
+              <a:t>09/04/2021</a:t>
             </a:fld>
             <a:endParaRPr lang="es-ES"/>
           </a:p>
@@ -1593,7 +1593,7 @@
           <a:p>
             <a:fld id="{B3030C24-9424-B24A-8613-79990C3AA492}" type="datetimeFigureOut">
               <a:rPr lang="es-ES" smtClean="0"/>
-              <a:t>31/03/2021</a:t>
+              <a:t>09/04/2021</a:t>
             </a:fld>
             <a:endParaRPr lang="es-ES"/>
           </a:p>
@@ -3874,7 +3874,7 @@
         </p:nvSpPr>
         <p:spPr>
           <a:xfrm>
-            <a:off x="4893735" y="1369780"/>
+            <a:off x="4893735" y="1210292"/>
             <a:ext cx="3801533" cy="4278094"/>
           </a:xfrm>
           <a:prstGeom prst="rect">
@@ -3913,9 +3913,18 @@
                     <a:lumOff val="25000"/>
                   </a:schemeClr>
                 </a:solidFill>
+                <a:hlinkClick r:id="rId2" action="ppaction://hlinkpres?slideindex=1&amp;slidetitle="/>
               </a:rPr>
               <a:t>Presentación de proyecto</a:t>
             </a:r>
+            <a:endParaRPr lang="es-ES_tradnl" sz="1600" dirty="0">
+              <a:solidFill>
+                <a:schemeClr val="tx1">
+                  <a:lumMod val="75000"/>
+                  <a:lumOff val="25000"/>
+                </a:schemeClr>
+              </a:solidFill>
+            </a:endParaRPr>
           </a:p>
           <a:p>
             <a:pPr marL="285750" indent="-285750" algn="just">
@@ -3930,9 +3939,18 @@
                     <a:lumOff val="25000"/>
                   </a:schemeClr>
                 </a:solidFill>
+                <a:hlinkClick r:id="rId3" action="ppaction://hlinkfile"/>
               </a:rPr>
               <a:t>Levantamiento de información</a:t>
             </a:r>
+            <a:endParaRPr lang="es-ES_tradnl" sz="1600" dirty="0">
+              <a:solidFill>
+                <a:schemeClr val="tx1">
+                  <a:lumMod val="75000"/>
+                  <a:lumOff val="25000"/>
+                </a:schemeClr>
+              </a:solidFill>
+            </a:endParaRPr>
           </a:p>
           <a:p>
             <a:pPr marL="285750" indent="-285750" algn="just">
@@ -3947,9 +3965,18 @@
                     <a:lumOff val="25000"/>
                   </a:schemeClr>
                 </a:solidFill>
+                <a:hlinkClick r:id="rId4" action="ppaction://hlinkfile"/>
               </a:rPr>
               <a:t>Diagrama de procesos</a:t>
             </a:r>
+            <a:endParaRPr lang="es-ES_tradnl" sz="1600" dirty="0">
+              <a:solidFill>
+                <a:schemeClr val="tx1">
+                  <a:lumMod val="75000"/>
+                  <a:lumOff val="25000"/>
+                </a:schemeClr>
+              </a:solidFill>
+            </a:endParaRPr>
           </a:p>
           <a:p>
             <a:pPr marL="285750" indent="-285750" algn="just">
@@ -3964,9 +3991,18 @@
                     <a:lumOff val="25000"/>
                   </a:schemeClr>
                 </a:solidFill>
+                <a:hlinkClick r:id="rId5" action="ppaction://hlinkfile"/>
               </a:rPr>
               <a:t>Preliminar inventario</a:t>
             </a:r>
+            <a:endParaRPr lang="es-ES_tradnl" sz="1600" dirty="0">
+              <a:solidFill>
+                <a:schemeClr val="tx1">
+                  <a:lumMod val="75000"/>
+                  <a:lumOff val="25000"/>
+                </a:schemeClr>
+              </a:solidFill>
+            </a:endParaRPr>
           </a:p>
           <a:p>
             <a:pPr marL="285750" indent="-285750" algn="just">
@@ -3981,9 +4017,18 @@
                     <a:lumOff val="25000"/>
                   </a:schemeClr>
                 </a:solidFill>
+                <a:hlinkClick r:id="rId6" action="ppaction://hlinkfile"/>
               </a:rPr>
               <a:t>Formulación del proyecto</a:t>
             </a:r>
+            <a:endParaRPr lang="es-ES_tradnl" sz="1600" dirty="0">
+              <a:solidFill>
+                <a:schemeClr val="tx1">
+                  <a:lumMod val="75000"/>
+                  <a:lumOff val="25000"/>
+                </a:schemeClr>
+              </a:solidFill>
+            </a:endParaRPr>
           </a:p>
           <a:p>
             <a:pPr marL="285750" indent="-285750" algn="just">
@@ -3998,9 +4043,18 @@
                     <a:lumOff val="25000"/>
                   </a:schemeClr>
                 </a:solidFill>
+                <a:hlinkClick r:id="rId7" action="ppaction://hlinkfile"/>
               </a:rPr>
               <a:t>IEEE830</a:t>
             </a:r>
+            <a:endParaRPr lang="es-ES_tradnl" sz="1600" dirty="0">
+              <a:solidFill>
+                <a:schemeClr val="tx1">
+                  <a:lumMod val="75000"/>
+                  <a:lumOff val="25000"/>
+                </a:schemeClr>
+              </a:solidFill>
+            </a:endParaRPr>
           </a:p>
           <a:p>
             <a:pPr marL="285750" indent="-285750" algn="just">
@@ -4043,9 +4097,18 @@
                     <a:lumOff val="25000"/>
                   </a:schemeClr>
                 </a:solidFill>
+                <a:hlinkClick r:id="rId8" action="ppaction://hlinkfile"/>
               </a:rPr>
               <a:t>Diagrama casos de uso</a:t>
             </a:r>
+            <a:endParaRPr lang="es-ES_tradnl" sz="1600" dirty="0">
+              <a:solidFill>
+                <a:schemeClr val="tx1">
+                  <a:lumMod val="75000"/>
+                  <a:lumOff val="25000"/>
+                </a:schemeClr>
+              </a:solidFill>
+            </a:endParaRPr>
           </a:p>
           <a:p>
             <a:pPr marL="285750" indent="-285750" algn="just">
@@ -4077,9 +4140,18 @@
                     <a:lumOff val="25000"/>
                   </a:schemeClr>
                 </a:solidFill>
+                <a:hlinkClick r:id="rId9" action="ppaction://hlinkfile"/>
               </a:rPr>
               <a:t>Modelo entidad relación</a:t>
             </a:r>
+            <a:endParaRPr lang="es-ES_tradnl" sz="1600" dirty="0">
+              <a:solidFill>
+                <a:schemeClr val="tx1">
+                  <a:lumMod val="75000"/>
+                  <a:lumOff val="25000"/>
+                </a:schemeClr>
+              </a:solidFill>
+            </a:endParaRPr>
           </a:p>
           <a:p>
             <a:pPr marL="285750" indent="-285750" algn="just">
@@ -4094,9 +4166,18 @@
                     <a:lumOff val="25000"/>
                   </a:schemeClr>
                 </a:solidFill>
+                <a:hlinkClick r:id="rId10" action="ppaction://hlinkfile"/>
               </a:rPr>
               <a:t>Diccionario de datos</a:t>
             </a:r>
+            <a:endParaRPr lang="es-ES_tradnl" sz="1600" dirty="0">
+              <a:solidFill>
+                <a:schemeClr val="tx1">
+                  <a:lumMod val="75000"/>
+                  <a:lumOff val="25000"/>
+                </a:schemeClr>
+              </a:solidFill>
+            </a:endParaRPr>
           </a:p>
           <a:p>
             <a:pPr marL="285750" indent="-285750" algn="just">
@@ -4111,9 +4192,18 @@
                     <a:lumOff val="25000"/>
                   </a:schemeClr>
                 </a:solidFill>
+                <a:hlinkClick r:id="rId11" action="ppaction://hlinkfile"/>
               </a:rPr>
               <a:t>Cronograma de actividades</a:t>
             </a:r>
+            <a:endParaRPr lang="es-ES_tradnl" sz="1600" dirty="0">
+              <a:solidFill>
+                <a:schemeClr val="tx1">
+                  <a:lumMod val="75000"/>
+                  <a:lumOff val="25000"/>
+                </a:schemeClr>
+              </a:solidFill>
+            </a:endParaRPr>
           </a:p>
           <a:p>
             <a:pPr marL="285750" indent="-285750" algn="just">
@@ -4174,7 +4264,7 @@
           <p:nvPr/>
         </p:nvPicPr>
         <p:blipFill rotWithShape="1">
-          <a:blip r:embed="rId2">
+          <a:blip r:embed="rId12">
             <a:extLst>
               <a:ext uri="{28A0092B-C50C-407E-A947-70E740481C1C}">
                 <a14:useLocalDpi xmlns:a14="http://schemas.microsoft.com/office/drawing/2010/main" val="0"/>

</xml_diff>